<commit_message>
Homework 3, in class additions to Lectures 13, 14
</commit_message>
<xml_diff>
--- a/Lectures/13_Generics.pptx
+++ b/Lectures/13_Generics.pptx
@@ -125,6 +125,11 @@
       </a:defRPr>
     </a:lvl9pPr>
   </p:defaultTextStyle>
+  <p:extLst>
+    <p:ext uri="{EFAFB233-063F-42B5-8137-9DF3F51BA10A}">
+      <p15:sldGuideLst xmlns:p15="http://schemas.microsoft.com/office/powerpoint/2012/main"/>
+    </p:ext>
+  </p:extLst>
 </p:presentation>
 </file>
 
@@ -275,7 +280,7 @@
           <a:p>
             <a:fld id="{34F230B5-9CB4-4A2D-9669-CCFEDFC39AB3}" type="datetimeFigureOut">
               <a:rPr lang="en-US" smtClean="0"/>
-              <a:t>3/1/2025</a:t>
+              <a:t>3/2/2025</a:t>
             </a:fld>
             <a:endParaRPr lang="en-US"/>
           </a:p>
@@ -473,7 +478,7 @@
           <a:p>
             <a:fld id="{34F230B5-9CB4-4A2D-9669-CCFEDFC39AB3}" type="datetimeFigureOut">
               <a:rPr lang="en-US" smtClean="0"/>
-              <a:t>3/1/2025</a:t>
+              <a:t>3/2/2025</a:t>
             </a:fld>
             <a:endParaRPr lang="en-US"/>
           </a:p>
@@ -681,7 +686,7 @@
           <a:p>
             <a:fld id="{34F230B5-9CB4-4A2D-9669-CCFEDFC39AB3}" type="datetimeFigureOut">
               <a:rPr lang="en-US" smtClean="0"/>
-              <a:t>3/1/2025</a:t>
+              <a:t>3/2/2025</a:t>
             </a:fld>
             <a:endParaRPr lang="en-US"/>
           </a:p>
@@ -822,7 +827,7 @@
           <a:p>
             <a:fld id="{34F230B5-9CB4-4A2D-9669-CCFEDFC39AB3}" type="datetimeFigureOut">
               <a:rPr lang="en-US" smtClean="0"/>
-              <a:t>3/1/2025</a:t>
+              <a:t>3/2/2025</a:t>
             </a:fld>
             <a:endParaRPr lang="en-US"/>
           </a:p>
@@ -1295,7 +1300,7 @@
           <a:p>
             <a:fld id="{34F230B5-9CB4-4A2D-9669-CCFEDFC39AB3}" type="datetimeFigureOut">
               <a:rPr lang="en-US" smtClean="0"/>
-              <a:t>3/1/2025</a:t>
+              <a:t>3/2/2025</a:t>
             </a:fld>
             <a:endParaRPr lang="en-US"/>
           </a:p>
@@ -1560,7 +1565,7 @@
           <a:p>
             <a:fld id="{34F230B5-9CB4-4A2D-9669-CCFEDFC39AB3}" type="datetimeFigureOut">
               <a:rPr lang="en-US" smtClean="0"/>
-              <a:t>3/1/2025</a:t>
+              <a:t>3/2/2025</a:t>
             </a:fld>
             <a:endParaRPr lang="en-US"/>
           </a:p>
@@ -1972,7 +1977,7 @@
           <a:p>
             <a:fld id="{34F230B5-9CB4-4A2D-9669-CCFEDFC39AB3}" type="datetimeFigureOut">
               <a:rPr lang="en-US" smtClean="0"/>
-              <a:t>3/1/2025</a:t>
+              <a:t>3/2/2025</a:t>
             </a:fld>
             <a:endParaRPr lang="en-US"/>
           </a:p>
@@ -2113,7 +2118,7 @@
           <a:p>
             <a:fld id="{34F230B5-9CB4-4A2D-9669-CCFEDFC39AB3}" type="datetimeFigureOut">
               <a:rPr lang="en-US" smtClean="0"/>
-              <a:t>3/1/2025</a:t>
+              <a:t>3/2/2025</a:t>
             </a:fld>
             <a:endParaRPr lang="en-US"/>
           </a:p>
@@ -2226,7 +2231,7 @@
           <a:p>
             <a:fld id="{34F230B5-9CB4-4A2D-9669-CCFEDFC39AB3}" type="datetimeFigureOut">
               <a:rPr lang="en-US" smtClean="0"/>
-              <a:t>3/1/2025</a:t>
+              <a:t>3/2/2025</a:t>
             </a:fld>
             <a:endParaRPr lang="en-US"/>
           </a:p>
@@ -2537,7 +2542,7 @@
           <a:p>
             <a:fld id="{34F230B5-9CB4-4A2D-9669-CCFEDFC39AB3}" type="datetimeFigureOut">
               <a:rPr lang="en-US" smtClean="0"/>
-              <a:t>3/1/2025</a:t>
+              <a:t>3/2/2025</a:t>
             </a:fld>
             <a:endParaRPr lang="en-US"/>
           </a:p>
@@ -2825,7 +2830,7 @@
           <a:p>
             <a:fld id="{34F230B5-9CB4-4A2D-9669-CCFEDFC39AB3}" type="datetimeFigureOut">
               <a:rPr lang="en-US" smtClean="0"/>
-              <a:t>3/1/2025</a:t>
+              <a:t>3/2/2025</a:t>
             </a:fld>
             <a:endParaRPr lang="en-US"/>
           </a:p>
@@ -3066,7 +3071,7 @@
           <a:p>
             <a:fld id="{34F230B5-9CB4-4A2D-9669-CCFEDFC39AB3}" type="datetimeFigureOut">
               <a:rPr lang="en-US" smtClean="0"/>
-              <a:t>3/1/2025</a:t>
+              <a:t>3/2/2025</a:t>
             </a:fld>
             <a:endParaRPr lang="en-US"/>
           </a:p>
@@ -3512,6 +3517,34 @@
           </a:p>
         </p:txBody>
       </p:sp>
+      <p:sp>
+        <p:nvSpPr>
+          <p:cNvPr id="3" name="Subtitle 2">
+            <a:extLst>
+              <a:ext uri="{FF2B5EF4-FFF2-40B4-BE49-F238E27FC236}">
+                <a16:creationId xmlns:a16="http://schemas.microsoft.com/office/drawing/2014/main" id="{7B7DE6A9-7221-330C-A38B-2CF7262E7383}"/>
+              </a:ext>
+            </a:extLst>
+          </p:cNvPr>
+          <p:cNvSpPr>
+            <a:spLocks noGrp="1"/>
+          </p:cNvSpPr>
+          <p:nvPr>
+            <p:ph type="subTitle" idx="1"/>
+          </p:nvPr>
+        </p:nvSpPr>
+        <p:spPr/>
+        <p:txBody>
+          <a:bodyPr/>
+          <a:lstStyle/>
+          <a:p>
+            <a:r>
+              <a:rPr lang="en-US" dirty="0"/>
+              <a:t>Disclaimer: This is a harder one to grasp, if there’s one to pay attention to, this is it.</a:t>
+            </a:r>
+          </a:p>
+        </p:txBody>
+      </p:sp>
     </p:spTree>
     <p:extLst>
       <p:ext uri="{BB962C8B-B14F-4D97-AF65-F5344CB8AC3E}">

</xml_diff>